<commit_message>
1st commit 10 feb 2017
</commit_message>
<xml_diff>
--- a/work/extra-assignments/css_media_queries.pptx
+++ b/work/extra-assignments/css_media_queries.pptx
@@ -7,8 +7,11 @@
   <p:sldIdLst>
     <p:sldId id="256" r:id="rId2"/>
     <p:sldId id="257" r:id="rId3"/>
-    <p:sldId id="258" r:id="rId4"/>
+    <p:sldId id="261" r:id="rId4"/>
     <p:sldId id="259" r:id="rId5"/>
+    <p:sldId id="258" r:id="rId6"/>
+    <p:sldId id="264" r:id="rId7"/>
+    <p:sldId id="263" r:id="rId8"/>
   </p:sldIdLst>
   <p:sldSz cx="12192000" cy="6858000"/>
   <p:notesSz cx="6858000" cy="9144000"/>
@@ -107,6 +110,11 @@
       </a:defRPr>
     </a:lvl9pPr>
   </p:defaultTextStyle>
+  <p:extLst>
+    <p:ext uri="{EFAFB233-063F-42B5-8137-9DF3F51BA10A}">
+      <p15:sldGuideLst xmlns:p15="http://schemas.microsoft.com/office/powerpoint/2012/main"/>
+    </p:ext>
+  </p:extLst>
 </p:presentation>
 </file>
 
@@ -274,7 +282,7 @@
         <p:spPr>
           <a:xfrm>
             <a:off x="1154955" y="2099733"/>
-            <a:ext cx="8825658" cy="2677648"/>
+            <a:ext cx="8825659" cy="2677648"/>
           </a:xfrm>
         </p:spPr>
         <p:txBody>
@@ -306,7 +314,7 @@
         <p:spPr bwMode="gray">
           <a:xfrm>
             <a:off x="1154955" y="4777380"/>
-            <a:ext cx="8825658" cy="861420"/>
+            <a:ext cx="8825659" cy="861420"/>
           </a:xfrm>
         </p:spPr>
         <p:txBody>
@@ -425,7 +433,7 @@
         </p:nvSpPr>
         <p:spPr bwMode="gray">
           <a:xfrm rot="5400000">
-            <a:off x="10158984" y="1792224"/>
+            <a:off x="10158986" y="1792226"/>
             <a:ext cx="990599" cy="304799"/>
           </a:xfrm>
         </p:spPr>
@@ -446,7 +454,7 @@
             <a:fld id="{1E700B27-DE4C-4B9E-BB11-B9027034A00F}" type="datetimeFigureOut">
               <a:rPr lang="en-US" smtClean="0"/>
               <a:pPr/>
-              <a:t>2/5/2017</a:t>
+              <a:t>2/6/2017</a:t>
             </a:fld>
             <a:endParaRPr lang="en-US" dirty="0"/>
           </a:p>
@@ -464,7 +472,7 @@
         </p:nvSpPr>
         <p:spPr bwMode="gray">
           <a:xfrm rot="5400000">
-            <a:off x="8951976" y="3227832"/>
+            <a:off x="8951977" y="3227834"/>
             <a:ext cx="3859795" cy="304801"/>
           </a:xfrm>
         </p:spPr>
@@ -539,7 +547,7 @@
         </p:nvSpPr>
         <p:spPr>
           <a:xfrm>
-            <a:off x="10352540" y="295729"/>
+            <a:off x="10352542" y="295731"/>
             <a:ext cx="838199" cy="767687"/>
           </a:xfrm>
         </p:spPr>
@@ -1348,7 +1356,7 @@
         </p:nvSpPr>
         <p:spPr>
           <a:xfrm>
-            <a:off x="1154954" y="4969927"/>
+            <a:off x="1154955" y="4969927"/>
             <a:ext cx="8825659" cy="566738"/>
           </a:xfrm>
         </p:spPr>
@@ -1382,7 +1390,7 @@
         </p:nvSpPr>
         <p:spPr>
           <a:xfrm>
-            <a:off x="1154954" y="685800"/>
+            <a:off x="1154955" y="685800"/>
             <a:ext cx="8825659" cy="3429000"/>
           </a:xfrm>
           <a:prstGeom prst="roundRect">
@@ -1461,8 +1469,8 @@
         </p:nvSpPr>
         <p:spPr>
           <a:xfrm>
-            <a:off x="1154954" y="5536665"/>
-            <a:ext cx="8825658" cy="493712"/>
+            <a:off x="1154953" y="5536665"/>
+            <a:ext cx="8825659" cy="493712"/>
           </a:xfrm>
         </p:spPr>
         <p:txBody>
@@ -1540,7 +1548,7 @@
           <a:p>
             <a:fld id="{C40F4739-9812-4A9F-890D-2AD6BA5F6EE8}" type="datetimeFigureOut">
               <a:rPr lang="en-US" smtClean="0"/>
-              <a:t>2/5/2017</a:t>
+              <a:t>2/6/2017</a:t>
             </a:fld>
             <a:endParaRPr lang="en-US" dirty="0"/>
           </a:p>
@@ -2422,7 +2430,7 @@
         </p:nvSpPr>
         <p:spPr>
           <a:xfrm>
-            <a:off x="1148798" y="1063417"/>
+            <a:off x="1148797" y="1063417"/>
             <a:ext cx="8831816" cy="1372986"/>
           </a:xfrm>
         </p:spPr>
@@ -2454,7 +2462,7 @@
         </p:nvSpPr>
         <p:spPr>
           <a:xfrm>
-            <a:off x="1154954" y="3543300"/>
+            <a:off x="1154955" y="3543300"/>
             <a:ext cx="8825659" cy="2476500"/>
           </a:xfrm>
         </p:spPr>
@@ -2526,7 +2534,7 @@
           <a:p>
             <a:fld id="{18845AC5-A3F8-44AA-BA8F-596CDCC976D3}" type="datetimeFigureOut">
               <a:rPr lang="en-US" smtClean="0"/>
-              <a:t>2/5/2017</a:t>
+              <a:t>2/6/2017</a:t>
             </a:fld>
             <a:endParaRPr lang="en-US" dirty="0"/>
           </a:p>
@@ -3404,7 +3412,7 @@
         </p:nvSpPr>
         <p:spPr bwMode="gray">
           <a:xfrm>
-            <a:off x="881566" y="607336"/>
+            <a:off x="881567" y="607336"/>
             <a:ext cx="801912" cy="1569660"/>
           </a:xfrm>
           <a:prstGeom prst="rect">
@@ -3443,7 +3451,7 @@
         </p:nvSpPr>
         <p:spPr bwMode="gray">
           <a:xfrm>
-            <a:off x="9884458" y="2613787"/>
+            <a:off x="9884459" y="2613787"/>
             <a:ext cx="652763" cy="1569660"/>
           </a:xfrm>
           <a:prstGeom prst="rect">
@@ -3486,8 +3494,8 @@
         </p:nvSpPr>
         <p:spPr>
           <a:xfrm>
-            <a:off x="1581878" y="982134"/>
-            <a:ext cx="8453906" cy="2696632"/>
+            <a:off x="1581877" y="982134"/>
+            <a:ext cx="8453907" cy="2696632"/>
           </a:xfrm>
         </p:spPr>
         <p:txBody>
@@ -3594,7 +3602,7 @@
         </p:nvSpPr>
         <p:spPr>
           <a:xfrm>
-            <a:off x="1154954" y="5029199"/>
+            <a:off x="1154956" y="5029201"/>
             <a:ext cx="9244897" cy="997857"/>
           </a:xfrm>
         </p:spPr>
@@ -3666,7 +3674,7 @@
           <a:p>
             <a:fld id="{C873B183-A821-4095-A363-9EC968635539}" type="datetimeFigureOut">
               <a:rPr lang="en-US" smtClean="0"/>
-              <a:t>2/5/2017</a:t>
+              <a:t>2/6/2017</a:t>
             </a:fld>
             <a:endParaRPr lang="en-US" dirty="0"/>
           </a:p>
@@ -4548,7 +4556,7 @@
         </p:nvSpPr>
         <p:spPr>
           <a:xfrm>
-            <a:off x="1154954" y="2370667"/>
+            <a:off x="1154955" y="2370667"/>
             <a:ext cx="8825660" cy="1822514"/>
           </a:xfrm>
         </p:spPr>
@@ -4580,7 +4588,7 @@
         </p:nvSpPr>
         <p:spPr>
           <a:xfrm>
-            <a:off x="1154954" y="5024967"/>
+            <a:off x="1154955" y="5024967"/>
             <a:ext cx="8825659" cy="860400"/>
           </a:xfrm>
         </p:spPr>
@@ -4705,7 +4713,7 @@
           <a:p>
             <a:fld id="{174D01B4-0AA5-45E6-B2E6-5FA4078AEBCF}" type="datetimeFigureOut">
               <a:rPr lang="en-US" smtClean="0"/>
-              <a:t>2/5/2017</a:t>
+              <a:t>2/6/2017</a:t>
             </a:fld>
             <a:endParaRPr lang="en-US" dirty="0"/>
           </a:p>
@@ -4837,7 +4845,7 @@
         </p:nvSpPr>
         <p:spPr>
           <a:xfrm>
-            <a:off x="1154954" y="973668"/>
+            <a:off x="1154955" y="973668"/>
             <a:ext cx="8825659" cy="706964"/>
           </a:xfrm>
         </p:spPr>
@@ -4870,7 +4878,7 @@
         <p:spPr>
           <a:xfrm>
             <a:off x="1154954" y="2603502"/>
-            <a:ext cx="3141878" cy="576262"/>
+            <a:ext cx="3141879" cy="576262"/>
           </a:xfrm>
         </p:spPr>
         <p:txBody>
@@ -4943,7 +4951,7 @@
         </p:nvSpPr>
         <p:spPr>
           <a:xfrm>
-            <a:off x="1154953" y="3179764"/>
+            <a:off x="1154954" y="3179766"/>
             <a:ext cx="3141879" cy="2847293"/>
           </a:xfrm>
         </p:spPr>
@@ -5010,7 +5018,7 @@
         </p:nvSpPr>
         <p:spPr>
           <a:xfrm>
-            <a:off x="4512721" y="2603500"/>
+            <a:off x="4512722" y="2603500"/>
             <a:ext cx="3147009" cy="576262"/>
           </a:xfrm>
         </p:spPr>
@@ -5084,7 +5092,7 @@
         </p:nvSpPr>
         <p:spPr>
           <a:xfrm>
-            <a:off x="4512721" y="3179763"/>
+            <a:off x="4512722" y="3179765"/>
             <a:ext cx="3147009" cy="2847293"/>
           </a:xfrm>
         </p:spPr>
@@ -5152,7 +5160,7 @@
         <p:spPr>
           <a:xfrm>
             <a:off x="7888135" y="2603501"/>
-            <a:ext cx="3145730" cy="576262"/>
+            <a:ext cx="3145731" cy="576262"/>
           </a:xfrm>
         </p:spPr>
         <p:txBody>
@@ -5225,7 +5233,7 @@
         </p:nvSpPr>
         <p:spPr>
           <a:xfrm>
-            <a:off x="7888329" y="3179762"/>
+            <a:off x="7888329" y="3179764"/>
             <a:ext cx="3145536" cy="2847293"/>
           </a:xfrm>
         </p:spPr>
@@ -5288,7 +5296,7 @@
         </p:nvCxnSpPr>
         <p:spPr>
           <a:xfrm>
-            <a:off x="4403971" y="2569633"/>
+            <a:off x="4403971" y="2569635"/>
             <a:ext cx="0" cy="3492499"/>
           </a:xfrm>
           <a:prstGeom prst="line">
@@ -5325,7 +5333,7 @@
         </p:nvCxnSpPr>
         <p:spPr>
           <a:xfrm>
-            <a:off x="7772401" y="2569633"/>
+            <a:off x="7772401" y="2569635"/>
             <a:ext cx="0" cy="3492499"/>
           </a:xfrm>
           <a:prstGeom prst="line">
@@ -5371,7 +5379,7 @@
           <a:p>
             <a:fld id="{4147335C-0450-40D7-8612-B3203BED4F28}" type="datetimeFigureOut">
               <a:rPr lang="en-US" smtClean="0"/>
-              <a:t>2/5/2017</a:t>
+              <a:t>2/6/2017</a:t>
             </a:fld>
             <a:endParaRPr lang="en-US" dirty="0"/>
           </a:p>
@@ -5467,7 +5475,7 @@
         </p:nvSpPr>
         <p:spPr>
           <a:xfrm>
-            <a:off x="1154954" y="973668"/>
+            <a:off x="1154955" y="973668"/>
             <a:ext cx="8825659" cy="706964"/>
           </a:xfrm>
         </p:spPr>
@@ -5500,7 +5508,7 @@
         <p:spPr>
           <a:xfrm>
             <a:off x="1154954" y="4532844"/>
-            <a:ext cx="3050438" cy="576262"/>
+            <a:ext cx="3050439" cy="576262"/>
           </a:xfrm>
         </p:spPr>
         <p:txBody>
@@ -5574,226 +5582,6 @@
         <p:spPr>
           <a:xfrm>
             <a:off x="1334553" y="2603500"/>
-            <a:ext cx="2691242" cy="1591510"/>
-          </a:xfrm>
-          <a:prstGeom prst="roundRect">
-            <a:avLst>
-              <a:gd name="adj" fmla="val 1858"/>
-            </a:avLst>
-          </a:prstGeom>
-          <a:effectLst>
-            <a:outerShdw blurRad="50800" dist="50800" dir="5400000" algn="tl" rotWithShape="0">
-              <a:srgbClr val="000000">
-                <a:alpha val="43000"/>
-              </a:srgbClr>
-            </a:outerShdw>
-          </a:effectLst>
-        </p:spPr>
-        <p:txBody>
-          <a:bodyPr anchor="t">
-            <a:normAutofit/>
-          </a:bodyPr>
-          <a:lstStyle>
-            <a:lvl1pPr marL="0" indent="0" algn="ctr">
-              <a:buNone/>
-              <a:defRPr sz="1600"/>
-            </a:lvl1pPr>
-            <a:lvl2pPr marL="457200" indent="0">
-              <a:buNone/>
-              <a:defRPr sz="1600"/>
-            </a:lvl2pPr>
-            <a:lvl3pPr marL="914400" indent="0">
-              <a:buNone/>
-              <a:defRPr sz="1600"/>
-            </a:lvl3pPr>
-            <a:lvl4pPr marL="1371600" indent="0">
-              <a:buNone/>
-              <a:defRPr sz="1600"/>
-            </a:lvl4pPr>
-            <a:lvl5pPr marL="1828800" indent="0">
-              <a:buNone/>
-              <a:defRPr sz="1600"/>
-            </a:lvl5pPr>
-            <a:lvl6pPr marL="2286000" indent="0">
-              <a:buNone/>
-              <a:defRPr sz="1600"/>
-            </a:lvl6pPr>
-            <a:lvl7pPr marL="2743200" indent="0">
-              <a:buNone/>
-              <a:defRPr sz="1600"/>
-            </a:lvl7pPr>
-            <a:lvl8pPr marL="3200400" indent="0">
-              <a:buNone/>
-              <a:defRPr sz="1600"/>
-            </a:lvl8pPr>
-            <a:lvl9pPr marL="3657600" indent="0">
-              <a:buNone/>
-              <a:defRPr sz="1600"/>
-            </a:lvl9pPr>
-          </a:lstStyle>
-          <a:p>
-            <a:r>
-              <a:rPr lang="en-US"/>
-              <a:t>Click icon to add picture</a:t>
-            </a:r>
-            <a:endParaRPr lang="en-US" dirty="0"/>
-          </a:p>
-        </p:txBody>
-      </p:sp>
-      <p:sp>
-        <p:nvSpPr>
-          <p:cNvPr id="22" name="Text Placeholder 3"/>
-          <p:cNvSpPr>
-            <a:spLocks noGrp="1"/>
-          </p:cNvSpPr>
-          <p:nvPr>
-            <p:ph type="body" sz="half" idx="18"/>
-          </p:nvPr>
-        </p:nvSpPr>
-        <p:spPr>
-          <a:xfrm>
-            <a:off x="1154954" y="5109106"/>
-            <a:ext cx="3050438" cy="917952"/>
-          </a:xfrm>
-        </p:spPr>
-        <p:txBody>
-          <a:bodyPr anchor="t">
-            <a:normAutofit/>
-          </a:bodyPr>
-          <a:lstStyle>
-            <a:lvl1pPr marL="0" indent="0">
-              <a:buNone/>
-              <a:defRPr sz="1400"/>
-            </a:lvl1pPr>
-            <a:lvl2pPr marL="457200" indent="0">
-              <a:buNone/>
-              <a:defRPr sz="1200"/>
-            </a:lvl2pPr>
-            <a:lvl3pPr marL="914400" indent="0">
-              <a:buNone/>
-              <a:defRPr sz="1000"/>
-            </a:lvl3pPr>
-            <a:lvl4pPr marL="1371600" indent="0">
-              <a:buNone/>
-              <a:defRPr sz="900"/>
-            </a:lvl4pPr>
-            <a:lvl5pPr marL="1828800" indent="0">
-              <a:buNone/>
-              <a:defRPr sz="900"/>
-            </a:lvl5pPr>
-            <a:lvl6pPr marL="2286000" indent="0">
-              <a:buNone/>
-              <a:defRPr sz="900"/>
-            </a:lvl6pPr>
-            <a:lvl7pPr marL="2743200" indent="0">
-              <a:buNone/>
-              <a:defRPr sz="900"/>
-            </a:lvl7pPr>
-            <a:lvl8pPr marL="3200400" indent="0">
-              <a:buNone/>
-              <a:defRPr sz="900"/>
-            </a:lvl8pPr>
-            <a:lvl9pPr marL="3657600" indent="0">
-              <a:buNone/>
-              <a:defRPr sz="900"/>
-            </a:lvl9pPr>
-          </a:lstStyle>
-          <a:p>
-            <a:pPr lvl="0"/>
-            <a:r>
-              <a:rPr lang="en-US"/>
-              <a:t>Edit Master text styles</a:t>
-            </a:r>
-          </a:p>
-        </p:txBody>
-      </p:sp>
-      <p:sp>
-        <p:nvSpPr>
-          <p:cNvPr id="5" name="Text Placeholder 4"/>
-          <p:cNvSpPr>
-            <a:spLocks noGrp="1"/>
-          </p:cNvSpPr>
-          <p:nvPr>
-            <p:ph type="body" sz="quarter" idx="3"/>
-          </p:nvPr>
-        </p:nvSpPr>
-        <p:spPr>
-          <a:xfrm>
-            <a:off x="4568865" y="4532844"/>
-            <a:ext cx="3050438" cy="576263"/>
-          </a:xfrm>
-        </p:spPr>
-        <p:txBody>
-          <a:bodyPr anchor="b">
-            <a:noAutofit/>
-          </a:bodyPr>
-          <a:lstStyle>
-            <a:lvl1pPr marL="0" indent="0">
-              <a:buNone/>
-              <a:defRPr sz="2400" b="0">
-                <a:solidFill>
-                  <a:schemeClr val="accent1">
-                    <a:lumMod val="60000"/>
-                    <a:lumOff val="40000"/>
-                  </a:schemeClr>
-                </a:solidFill>
-              </a:defRPr>
-            </a:lvl1pPr>
-            <a:lvl2pPr marL="457200" indent="0">
-              <a:buNone/>
-              <a:defRPr sz="2000" b="1"/>
-            </a:lvl2pPr>
-            <a:lvl3pPr marL="914400" indent="0">
-              <a:buNone/>
-              <a:defRPr sz="1800" b="1"/>
-            </a:lvl3pPr>
-            <a:lvl4pPr marL="1371600" indent="0">
-              <a:buNone/>
-              <a:defRPr sz="1600" b="1"/>
-            </a:lvl4pPr>
-            <a:lvl5pPr marL="1828800" indent="0">
-              <a:buNone/>
-              <a:defRPr sz="1600" b="1"/>
-            </a:lvl5pPr>
-            <a:lvl6pPr marL="2286000" indent="0">
-              <a:buNone/>
-              <a:defRPr sz="1600" b="1"/>
-            </a:lvl6pPr>
-            <a:lvl7pPr marL="2743200" indent="0">
-              <a:buNone/>
-              <a:defRPr sz="1600" b="1"/>
-            </a:lvl7pPr>
-            <a:lvl8pPr marL="3200400" indent="0">
-              <a:buNone/>
-              <a:defRPr sz="1600" b="1"/>
-            </a:lvl8pPr>
-            <a:lvl9pPr marL="3657600" indent="0">
-              <a:buNone/>
-              <a:defRPr sz="1600" b="1"/>
-            </a:lvl9pPr>
-          </a:lstStyle>
-          <a:p>
-            <a:pPr lvl="0"/>
-            <a:r>
-              <a:rPr lang="en-US"/>
-              <a:t>Edit Master text styles</a:t>
-            </a:r>
-          </a:p>
-        </p:txBody>
-      </p:sp>
-      <p:sp>
-        <p:nvSpPr>
-          <p:cNvPr id="41" name="Picture Placeholder 2"/>
-          <p:cNvSpPr>
-            <a:spLocks noGrp="1" noChangeAspect="1"/>
-          </p:cNvSpPr>
-          <p:nvPr>
-            <p:ph type="pic" idx="21"/>
-          </p:nvPr>
-        </p:nvSpPr>
-        <p:spPr>
-          <a:xfrm>
-            <a:off x="4748462" y="2603500"/>
             <a:ext cx="2691243" cy="1591510"/>
           </a:xfrm>
           <a:prstGeom prst="roundRect">
@@ -5862,6 +5650,226 @@
       </p:sp>
       <p:sp>
         <p:nvSpPr>
+          <p:cNvPr id="22" name="Text Placeholder 3"/>
+          <p:cNvSpPr>
+            <a:spLocks noGrp="1"/>
+          </p:cNvSpPr>
+          <p:nvPr>
+            <p:ph type="body" sz="half" idx="18"/>
+          </p:nvPr>
+        </p:nvSpPr>
+        <p:spPr>
+          <a:xfrm>
+            <a:off x="1154954" y="5109106"/>
+            <a:ext cx="3050439" cy="917952"/>
+          </a:xfrm>
+        </p:spPr>
+        <p:txBody>
+          <a:bodyPr anchor="t">
+            <a:normAutofit/>
+          </a:bodyPr>
+          <a:lstStyle>
+            <a:lvl1pPr marL="0" indent="0">
+              <a:buNone/>
+              <a:defRPr sz="1400"/>
+            </a:lvl1pPr>
+            <a:lvl2pPr marL="457200" indent="0">
+              <a:buNone/>
+              <a:defRPr sz="1200"/>
+            </a:lvl2pPr>
+            <a:lvl3pPr marL="914400" indent="0">
+              <a:buNone/>
+              <a:defRPr sz="1000"/>
+            </a:lvl3pPr>
+            <a:lvl4pPr marL="1371600" indent="0">
+              <a:buNone/>
+              <a:defRPr sz="900"/>
+            </a:lvl4pPr>
+            <a:lvl5pPr marL="1828800" indent="0">
+              <a:buNone/>
+              <a:defRPr sz="900"/>
+            </a:lvl5pPr>
+            <a:lvl6pPr marL="2286000" indent="0">
+              <a:buNone/>
+              <a:defRPr sz="900"/>
+            </a:lvl6pPr>
+            <a:lvl7pPr marL="2743200" indent="0">
+              <a:buNone/>
+              <a:defRPr sz="900"/>
+            </a:lvl7pPr>
+            <a:lvl8pPr marL="3200400" indent="0">
+              <a:buNone/>
+              <a:defRPr sz="900"/>
+            </a:lvl8pPr>
+            <a:lvl9pPr marL="3657600" indent="0">
+              <a:buNone/>
+              <a:defRPr sz="900"/>
+            </a:lvl9pPr>
+          </a:lstStyle>
+          <a:p>
+            <a:pPr lvl="0"/>
+            <a:r>
+              <a:rPr lang="en-US"/>
+              <a:t>Edit Master text styles</a:t>
+            </a:r>
+          </a:p>
+        </p:txBody>
+      </p:sp>
+      <p:sp>
+        <p:nvSpPr>
+          <p:cNvPr id="5" name="Text Placeholder 4"/>
+          <p:cNvSpPr>
+            <a:spLocks noGrp="1"/>
+          </p:cNvSpPr>
+          <p:nvPr>
+            <p:ph type="body" sz="quarter" idx="3"/>
+          </p:nvPr>
+        </p:nvSpPr>
+        <p:spPr>
+          <a:xfrm>
+            <a:off x="4568866" y="4532846"/>
+            <a:ext cx="3050439" cy="576263"/>
+          </a:xfrm>
+        </p:spPr>
+        <p:txBody>
+          <a:bodyPr anchor="b">
+            <a:noAutofit/>
+          </a:bodyPr>
+          <a:lstStyle>
+            <a:lvl1pPr marL="0" indent="0">
+              <a:buNone/>
+              <a:defRPr sz="2400" b="0">
+                <a:solidFill>
+                  <a:schemeClr val="accent1">
+                    <a:lumMod val="60000"/>
+                    <a:lumOff val="40000"/>
+                  </a:schemeClr>
+                </a:solidFill>
+              </a:defRPr>
+            </a:lvl1pPr>
+            <a:lvl2pPr marL="457200" indent="0">
+              <a:buNone/>
+              <a:defRPr sz="2000" b="1"/>
+            </a:lvl2pPr>
+            <a:lvl3pPr marL="914400" indent="0">
+              <a:buNone/>
+              <a:defRPr sz="1800" b="1"/>
+            </a:lvl3pPr>
+            <a:lvl4pPr marL="1371600" indent="0">
+              <a:buNone/>
+              <a:defRPr sz="1600" b="1"/>
+            </a:lvl4pPr>
+            <a:lvl5pPr marL="1828800" indent="0">
+              <a:buNone/>
+              <a:defRPr sz="1600" b="1"/>
+            </a:lvl5pPr>
+            <a:lvl6pPr marL="2286000" indent="0">
+              <a:buNone/>
+              <a:defRPr sz="1600" b="1"/>
+            </a:lvl6pPr>
+            <a:lvl7pPr marL="2743200" indent="0">
+              <a:buNone/>
+              <a:defRPr sz="1600" b="1"/>
+            </a:lvl7pPr>
+            <a:lvl8pPr marL="3200400" indent="0">
+              <a:buNone/>
+              <a:defRPr sz="1600" b="1"/>
+            </a:lvl8pPr>
+            <a:lvl9pPr marL="3657600" indent="0">
+              <a:buNone/>
+              <a:defRPr sz="1600" b="1"/>
+            </a:lvl9pPr>
+          </a:lstStyle>
+          <a:p>
+            <a:pPr lvl="0"/>
+            <a:r>
+              <a:rPr lang="en-US"/>
+              <a:t>Edit Master text styles</a:t>
+            </a:r>
+          </a:p>
+        </p:txBody>
+      </p:sp>
+      <p:sp>
+        <p:nvSpPr>
+          <p:cNvPr id="41" name="Picture Placeholder 2"/>
+          <p:cNvSpPr>
+            <a:spLocks noGrp="1" noChangeAspect="1"/>
+          </p:cNvSpPr>
+          <p:nvPr>
+            <p:ph type="pic" idx="21"/>
+          </p:nvPr>
+        </p:nvSpPr>
+        <p:spPr>
+          <a:xfrm>
+            <a:off x="4748463" y="2603500"/>
+            <a:ext cx="2691243" cy="1591510"/>
+          </a:xfrm>
+          <a:prstGeom prst="roundRect">
+            <a:avLst>
+              <a:gd name="adj" fmla="val 1858"/>
+            </a:avLst>
+          </a:prstGeom>
+          <a:effectLst>
+            <a:outerShdw blurRad="50800" dist="50800" dir="5400000" algn="tl" rotWithShape="0">
+              <a:srgbClr val="000000">
+                <a:alpha val="43000"/>
+              </a:srgbClr>
+            </a:outerShdw>
+          </a:effectLst>
+        </p:spPr>
+        <p:txBody>
+          <a:bodyPr anchor="t">
+            <a:normAutofit/>
+          </a:bodyPr>
+          <a:lstStyle>
+            <a:lvl1pPr marL="0" indent="0" algn="ctr">
+              <a:buNone/>
+              <a:defRPr sz="1600"/>
+            </a:lvl1pPr>
+            <a:lvl2pPr marL="457200" indent="0">
+              <a:buNone/>
+              <a:defRPr sz="1600"/>
+            </a:lvl2pPr>
+            <a:lvl3pPr marL="914400" indent="0">
+              <a:buNone/>
+              <a:defRPr sz="1600"/>
+            </a:lvl3pPr>
+            <a:lvl4pPr marL="1371600" indent="0">
+              <a:buNone/>
+              <a:defRPr sz="1600"/>
+            </a:lvl4pPr>
+            <a:lvl5pPr marL="1828800" indent="0">
+              <a:buNone/>
+              <a:defRPr sz="1600"/>
+            </a:lvl5pPr>
+            <a:lvl6pPr marL="2286000" indent="0">
+              <a:buNone/>
+              <a:defRPr sz="1600"/>
+            </a:lvl6pPr>
+            <a:lvl7pPr marL="2743200" indent="0">
+              <a:buNone/>
+              <a:defRPr sz="1600"/>
+            </a:lvl7pPr>
+            <a:lvl8pPr marL="3200400" indent="0">
+              <a:buNone/>
+              <a:defRPr sz="1600"/>
+            </a:lvl8pPr>
+            <a:lvl9pPr marL="3657600" indent="0">
+              <a:buNone/>
+              <a:defRPr sz="1600"/>
+            </a:lvl9pPr>
+          </a:lstStyle>
+          <a:p>
+            <a:r>
+              <a:rPr lang="en-US"/>
+              <a:t>Click icon to add picture</a:t>
+            </a:r>
+            <a:endParaRPr lang="en-US" dirty="0"/>
+          </a:p>
+        </p:txBody>
+      </p:sp>
+      <p:sp>
+        <p:nvSpPr>
           <p:cNvPr id="23" name="Text Placeholder 3"/>
           <p:cNvSpPr>
             <a:spLocks noGrp="1"/>
@@ -5872,8 +5880,8 @@
         </p:nvSpPr>
         <p:spPr>
           <a:xfrm>
-            <a:off x="4570172" y="5109105"/>
-            <a:ext cx="3050438" cy="917952"/>
+            <a:off x="4570173" y="5109105"/>
+            <a:ext cx="3050439" cy="917952"/>
           </a:xfrm>
         </p:spPr>
         <p:txBody>
@@ -5939,7 +5947,7 @@
         </p:nvSpPr>
         <p:spPr>
           <a:xfrm>
-            <a:off x="7982775" y="4532845"/>
+            <a:off x="7982777" y="4532845"/>
             <a:ext cx="3051095" cy="576262"/>
           </a:xfrm>
         </p:spPr>
@@ -6014,7 +6022,7 @@
         <p:spPr>
           <a:xfrm>
             <a:off x="8163031" y="2603500"/>
-            <a:ext cx="2691242" cy="1591510"/>
+            <a:ext cx="2691243" cy="1591510"/>
           </a:xfrm>
           <a:prstGeom prst="roundRect">
             <a:avLst>
@@ -6155,7 +6163,7 @@
         </p:nvCxnSpPr>
         <p:spPr>
           <a:xfrm>
-            <a:off x="4405831" y="2569633"/>
+            <a:off x="4405831" y="2569635"/>
             <a:ext cx="0" cy="3492499"/>
           </a:xfrm>
           <a:prstGeom prst="line">
@@ -6192,7 +6200,7 @@
         </p:nvCxnSpPr>
         <p:spPr>
           <a:xfrm>
-            <a:off x="7797802" y="2569633"/>
+            <a:off x="7797803" y="2569635"/>
             <a:ext cx="0" cy="3492499"/>
           </a:xfrm>
           <a:prstGeom prst="line">
@@ -6238,7 +6246,7 @@
           <a:p>
             <a:fld id="{D246A105-2A1C-4284-B4EA-07CF89B1A393}" type="datetimeFigureOut">
               <a:rPr lang="en-US" smtClean="0"/>
-              <a:t>2/5/2017</a:t>
+              <a:t>2/6/2017</a:t>
             </a:fld>
             <a:endParaRPr lang="en-US" dirty="0"/>
           </a:p>
@@ -6256,8 +6264,8 @@
         </p:nvSpPr>
         <p:spPr>
           <a:xfrm>
-            <a:off x="561111" y="6391838"/>
-            <a:ext cx="3644282" cy="304801"/>
+            <a:off x="561111" y="6391840"/>
+            <a:ext cx="3644283" cy="304801"/>
           </a:xfrm>
         </p:spPr>
         <p:txBody>
@@ -6339,7 +6347,7 @@
         </p:nvSpPr>
         <p:spPr>
           <a:xfrm>
-            <a:off x="1154954" y="973668"/>
+            <a:off x="1154955" y="973668"/>
             <a:ext cx="8825659" cy="706964"/>
           </a:xfrm>
         </p:spPr>
@@ -6367,7 +6375,7 @@
         </p:nvSpPr>
         <p:spPr>
           <a:xfrm>
-            <a:off x="1154954" y="2603500"/>
+            <a:off x="1154955" y="2603500"/>
             <a:ext cx="8825659" cy="3416300"/>
           </a:xfrm>
         </p:spPr>
@@ -6424,7 +6432,7 @@
         </p:nvSpPr>
         <p:spPr>
           <a:xfrm>
-            <a:off x="10695439" y="6391838"/>
+            <a:off x="10695441" y="6391840"/>
             <a:ext cx="990599" cy="304799"/>
           </a:xfrm>
         </p:spPr>
@@ -6434,7 +6442,7 @@
           <a:p>
             <a:fld id="{80DBE609-F3F2-45E6-BD6A-E03A8C86C1AE}" type="datetimeFigureOut">
               <a:rPr lang="en-US" smtClean="0"/>
-              <a:t>2/5/2017</a:t>
+              <a:t>2/6/2017</a:t>
             </a:fld>
             <a:endParaRPr lang="en-US" dirty="0"/>
           </a:p>
@@ -7317,7 +7325,7 @@
         </p:nvSpPr>
         <p:spPr>
           <a:xfrm>
-            <a:off x="8585235" y="1278467"/>
+            <a:off x="8585236" y="1278467"/>
             <a:ext cx="1409965" cy="4748590"/>
           </a:xfrm>
         </p:spPr>
@@ -7345,7 +7353,7 @@
         </p:nvSpPr>
         <p:spPr>
           <a:xfrm>
-            <a:off x="1154954" y="1278467"/>
+            <a:off x="1154956" y="1278467"/>
             <a:ext cx="6256025" cy="4748590"/>
           </a:xfrm>
         </p:spPr>
@@ -7402,7 +7410,7 @@
         </p:nvSpPr>
         <p:spPr>
           <a:xfrm>
-            <a:off x="10653104" y="6391838"/>
+            <a:off x="10653106" y="6391840"/>
             <a:ext cx="992135" cy="304799"/>
           </a:xfrm>
         </p:spPr>
@@ -7412,7 +7420,7 @@
           <a:p>
             <a:fld id="{7A24AD68-089C-4467-A8F3-EA2BBCA6B44E}" type="datetimeFigureOut">
               <a:rPr lang="en-US" smtClean="0"/>
-              <a:t>2/5/2017</a:t>
+              <a:t>2/6/2017</a:t>
             </a:fld>
             <a:endParaRPr lang="en-US" dirty="0"/>
           </a:p>
@@ -7567,7 +7575,7 @@
         </p:nvSpPr>
         <p:spPr>
           <a:xfrm>
-            <a:off x="1154954" y="2603500"/>
+            <a:off x="1154955" y="2603500"/>
             <a:ext cx="8825659" cy="3416300"/>
           </a:xfrm>
         </p:spPr>
@@ -7629,7 +7637,7 @@
           <a:p>
             <a:fld id="{75C51FCE-E4BB-4680-8E50-3C0E348D2609}" type="datetimeFigureOut">
               <a:rPr lang="en-US" smtClean="0"/>
-              <a:t>2/5/2017</a:t>
+              <a:t>2/6/2017</a:t>
             </a:fld>
             <a:endParaRPr lang="en-US" dirty="0"/>
           </a:p>
@@ -8512,7 +8520,7 @@
         </p:nvSpPr>
         <p:spPr>
           <a:xfrm>
-            <a:off x="1154954" y="2677645"/>
+            <a:off x="1154956" y="2677645"/>
             <a:ext cx="4351025" cy="2283824"/>
           </a:xfrm>
         </p:spPr>
@@ -8544,7 +8552,7 @@
         </p:nvSpPr>
         <p:spPr>
           <a:xfrm>
-            <a:off x="6895559" y="2677644"/>
+            <a:off x="6895561" y="2677644"/>
             <a:ext cx="3757545" cy="2283824"/>
           </a:xfrm>
         </p:spPr>
@@ -8669,7 +8677,7 @@
           <a:p>
             <a:fld id="{8AAA073D-A903-47F8-8D16-77642FB0DF1F}" type="datetimeFigureOut">
               <a:rPr lang="en-US" smtClean="0"/>
-              <a:t>2/5/2017</a:t>
+              <a:t>2/6/2017</a:t>
             </a:fld>
             <a:endParaRPr lang="en-US" dirty="0"/>
           </a:p>
@@ -8824,8 +8832,8 @@
         </p:nvSpPr>
         <p:spPr>
           <a:xfrm>
-            <a:off x="1154954" y="2603500"/>
-            <a:ext cx="4825158" cy="3416301"/>
+            <a:off x="1154954" y="2603502"/>
+            <a:ext cx="4825159" cy="3416301"/>
           </a:xfrm>
         </p:spPr>
         <p:txBody>
@@ -8883,7 +8891,7 @@
         </p:nvSpPr>
         <p:spPr>
           <a:xfrm>
-            <a:off x="6208712" y="2603500"/>
+            <a:off x="6208714" y="2603500"/>
             <a:ext cx="4825159" cy="3416300"/>
           </a:xfrm>
         </p:spPr>
@@ -8947,7 +8955,7 @@
           <a:p>
             <a:fld id="{AB91FA40-626B-4CA1-85D0-7A9016E395BA}" type="datetimeFigureOut">
               <a:rPr lang="en-US" smtClean="0"/>
-              <a:t>2/5/2017</a:t>
+              <a:t>2/6/2017</a:t>
             </a:fld>
             <a:endParaRPr lang="en-US" dirty="0"/>
           </a:p>
@@ -9070,7 +9078,7 @@
         </p:nvSpPr>
         <p:spPr>
           <a:xfrm>
-            <a:off x="1154954" y="2603500"/>
+            <a:off x="1154955" y="2603500"/>
             <a:ext cx="4825157" cy="576262"/>
           </a:xfrm>
         </p:spPr>
@@ -9141,8 +9149,8 @@
         </p:nvSpPr>
         <p:spPr>
           <a:xfrm>
-            <a:off x="1154954" y="3179762"/>
-            <a:ext cx="4825158" cy="2840039"/>
+            <a:off x="1154954" y="3179764"/>
+            <a:ext cx="4825159" cy="2840039"/>
           </a:xfrm>
         </p:spPr>
         <p:txBody>
@@ -9200,7 +9208,7 @@
         </p:nvSpPr>
         <p:spPr>
           <a:xfrm>
-            <a:off x="6208712" y="2603500"/>
+            <a:off x="6208714" y="2603500"/>
             <a:ext cx="4825159" cy="576262"/>
           </a:xfrm>
         </p:spPr>
@@ -9271,7 +9279,7 @@
         </p:nvSpPr>
         <p:spPr>
           <a:xfrm>
-            <a:off x="6208712" y="3179762"/>
+            <a:off x="6208714" y="3179764"/>
             <a:ext cx="4825159" cy="2840039"/>
           </a:xfrm>
         </p:spPr>
@@ -9363,7 +9371,7 @@
           <a:p>
             <a:fld id="{C3F425EA-B9DC-48A7-991E-9A82573B1B21}" type="datetimeFigureOut">
               <a:rPr lang="en-US" smtClean="0"/>
-              <a:t>2/5/2017</a:t>
+              <a:t>2/6/2017</a:t>
             </a:fld>
             <a:endParaRPr lang="en-US" dirty="0"/>
           </a:p>
@@ -9459,7 +9467,7 @@
         </p:nvSpPr>
         <p:spPr>
           <a:xfrm>
-            <a:off x="1154954" y="973668"/>
+            <a:off x="1154955" y="973668"/>
             <a:ext cx="8761413" cy="706964"/>
           </a:xfrm>
         </p:spPr>
@@ -9496,7 +9504,7 @@
           <a:p>
             <a:fld id="{66CB97F8-6CEB-469B-AFCC-889F2A2B1D5A}" type="datetimeFigureOut">
               <a:rPr lang="en-US" smtClean="0"/>
-              <a:t>2/5/2017</a:t>
+              <a:t>2/6/2017</a:t>
             </a:fld>
             <a:endParaRPr lang="en-US" dirty="0"/>
           </a:p>
@@ -9597,7 +9605,7 @@
           <a:p>
             <a:fld id="{8FA9179F-009E-4FA5-B091-7EBB82A185BD}" type="datetimeFigureOut">
               <a:rPr lang="en-US" smtClean="0"/>
-              <a:t>2/5/2017</a:t>
+              <a:t>2/6/2017</a:t>
             </a:fld>
             <a:endParaRPr lang="en-US" dirty="0"/>
           </a:p>
@@ -10517,7 +10525,7 @@
         <p:spPr>
           <a:xfrm>
             <a:off x="1154955" y="1295400"/>
-            <a:ext cx="2793158" cy="1600200"/>
+            <a:ext cx="2793159" cy="1600200"/>
           </a:xfrm>
         </p:spPr>
         <p:txBody>
@@ -10548,8 +10556,8 @@
         </p:nvSpPr>
         <p:spPr>
           <a:xfrm>
-            <a:off x="5781146" y="1447800"/>
-            <a:ext cx="5190066" cy="4572000"/>
+            <a:off x="5781145" y="1447800"/>
+            <a:ext cx="5190067" cy="4572000"/>
           </a:xfrm>
         </p:spPr>
         <p:txBody>
@@ -10607,8 +10615,8 @@
         </p:nvSpPr>
         <p:spPr bwMode="gray">
           <a:xfrm>
-            <a:off x="1154954" y="3129280"/>
-            <a:ext cx="2793158" cy="2895599"/>
+            <a:off x="1154954" y="3129282"/>
+            <a:ext cx="2793159" cy="2895599"/>
           </a:xfrm>
         </p:spPr>
         <p:txBody>
@@ -10684,7 +10692,7 @@
           <a:p>
             <a:fld id="{8E665CEB-0076-4E37-B880-BCEA9784DE0A}" type="datetimeFigureOut">
               <a:rPr lang="en-US" smtClean="0"/>
-              <a:t>2/5/2017</a:t>
+              <a:t>2/6/2017</a:t>
             </a:fld>
             <a:endParaRPr lang="en-US" dirty="0"/>
           </a:p>
@@ -11603,8 +11611,8 @@
         </p:nvSpPr>
         <p:spPr>
           <a:xfrm>
-            <a:off x="1154955" y="1693333"/>
-            <a:ext cx="3865134" cy="1735667"/>
+            <a:off x="1154955" y="1693335"/>
+            <a:ext cx="3865135" cy="1735667"/>
           </a:xfrm>
         </p:spPr>
         <p:txBody>
@@ -11637,7 +11645,7 @@
         </p:nvSpPr>
         <p:spPr>
           <a:xfrm>
-            <a:off x="6547870" y="1143000"/>
+            <a:off x="6547872" y="1143000"/>
             <a:ext cx="3227193" cy="4572000"/>
           </a:xfrm>
           <a:prstGeom prst="roundRect">
@@ -11719,7 +11727,7 @@
         </p:nvSpPr>
         <p:spPr bwMode="gray">
           <a:xfrm>
-            <a:off x="1154954" y="3657600"/>
+            <a:off x="1154955" y="3657600"/>
             <a:ext cx="3859212" cy="1371600"/>
           </a:xfrm>
         </p:spPr>
@@ -11798,7 +11806,7 @@
           <a:p>
             <a:fld id="{A6149E5E-3896-4118-99A7-7B85668F1C5E}" type="datetimeFigureOut">
               <a:rPr lang="en-US" smtClean="0"/>
-              <a:t>2/5/2017</a:t>
+              <a:t>2/6/2017</a:t>
             </a:fld>
             <a:endParaRPr lang="en-US" dirty="0"/>
           </a:p>
@@ -12685,7 +12693,7 @@
         </p:nvSpPr>
         <p:spPr bwMode="gray">
           <a:xfrm>
-            <a:off x="1154954" y="973668"/>
+            <a:off x="1154955" y="973668"/>
             <a:ext cx="8761413" cy="706964"/>
           </a:xfrm>
           <a:prstGeom prst="rect">
@@ -12718,7 +12726,7 @@
         </p:nvSpPr>
         <p:spPr>
           <a:xfrm>
-            <a:off x="1154954" y="2603500"/>
+            <a:off x="1154955" y="2603500"/>
             <a:ext cx="8761413" cy="3416300"/>
           </a:xfrm>
           <a:prstGeom prst="rect">
@@ -12780,7 +12788,7 @@
         </p:nvSpPr>
         <p:spPr>
           <a:xfrm>
-            <a:off x="10653104" y="6391838"/>
+            <a:off x="10653106" y="6391840"/>
             <a:ext cx="990599" cy="304799"/>
           </a:xfrm>
           <a:prstGeom prst="rect">
@@ -12801,7 +12809,7 @@
           <a:p>
             <a:fld id="{7E0D914D-B099-4142-A885-11F276715148}" type="datetimeFigureOut">
               <a:rPr lang="en-US" smtClean="0"/>
-              <a:t>2/5/2017</a:t>
+              <a:t>2/6/2017</a:t>
             </a:fld>
             <a:endParaRPr lang="en-US" dirty="0"/>
           </a:p>
@@ -12819,7 +12827,7 @@
         </p:nvSpPr>
         <p:spPr>
           <a:xfrm>
-            <a:off x="561110" y="6391838"/>
+            <a:off x="561111" y="6391840"/>
             <a:ext cx="3859795" cy="304801"/>
           </a:xfrm>
           <a:prstGeom prst="rect">
@@ -12895,7 +12903,7 @@
         </p:nvSpPr>
         <p:spPr bwMode="gray">
           <a:xfrm>
-            <a:off x="10352540" y="295729"/>
+            <a:off x="10352542" y="295731"/>
             <a:ext cx="838199" cy="767687"/>
           </a:xfrm>
           <a:prstGeom prst="rect">
@@ -13475,13 +13483,50 @@
         </p:nvSpPr>
         <p:spPr/>
         <p:txBody>
-          <a:bodyPr/>
+          <a:bodyPr>
+            <a:normAutofit/>
+          </a:bodyPr>
           <a:lstStyle/>
           <a:p>
             <a:r>
               <a:rPr lang="en-US" dirty="0"/>
               <a:t>Introduced in CSS2</a:t>
             </a:r>
+          </a:p>
+          <a:p>
+            <a:r>
+              <a:rPr lang="en-US" dirty="0"/>
+              <a:t>The @</a:t>
+            </a:r>
+            <a:r>
+              <a:rPr lang="en-US" b="1" dirty="0"/>
+              <a:t>media</a:t>
+            </a:r>
+            <a:r>
+              <a:rPr lang="en-US" dirty="0"/>
+              <a:t> rule is </a:t>
+            </a:r>
+            <a:r>
+              <a:rPr lang="en-US" b="1" dirty="0"/>
+              <a:t>used</a:t>
+            </a:r>
+            <a:r>
+              <a:rPr lang="en-US" dirty="0"/>
+              <a:t> to define different style rules for different </a:t>
+            </a:r>
+            <a:r>
+              <a:rPr lang="en-US" b="1" dirty="0" err="1"/>
+              <a:t>media</a:t>
+            </a:r>
+            <a:r>
+              <a:rPr lang="en-US" dirty="0" err="1"/>
+              <a:t>types</a:t>
+            </a:r>
+            <a:r>
+              <a:rPr lang="en-US" dirty="0"/>
+              <a:t>/devices</a:t>
+            </a:r>
+            <a:endParaRPr lang="en-US" dirty="0"/>
           </a:p>
           <a:p>
             <a:r>
@@ -13501,20 +13546,6 @@
             <a:r>
               <a:rPr lang="en-US" dirty="0"/>
               <a:t>This is especially helpful to change up things like a horizontal menu to become a vertical menu when there isn’t room for the menu</a:t>
-            </a:r>
-          </a:p>
-          <a:p>
-            <a:r>
-              <a:rPr lang="en-US" dirty="0"/>
-              <a:t>In addition, this is a way that sites can be compatible with specific devices (such as TV’s or </a:t>
-            </a:r>
-            <a:r>
-              <a:rPr lang="en-US" dirty="0" err="1"/>
-              <a:t>Braile</a:t>
-            </a:r>
-            <a:r>
-              <a:rPr lang="en-US" dirty="0"/>
-              <a:t> devices</a:t>
             </a:r>
           </a:p>
         </p:txBody>
@@ -13549,31 +13580,6 @@
           <a:chExt cx="0" cy="0"/>
         </a:xfrm>
       </p:grpSpPr>
-      <p:pic>
-        <p:nvPicPr>
-          <p:cNvPr id="6" name="Content Placeholder 3"/>
-          <p:cNvPicPr>
-            <a:picLocks noChangeAspect="1"/>
-          </p:cNvPicPr>
-          <p:nvPr/>
-        </p:nvPicPr>
-        <p:blipFill rotWithShape="1">
-          <a:blip r:embed="rId2">
-            <a:alphaModFix/>
-          </a:blip>
-          <a:srcRect l="20181" t="6091" b="7739"/>
-          <a:stretch/>
-        </p:blipFill>
-        <p:spPr>
-          <a:xfrm>
-            <a:off x="410816" y="0"/>
-            <a:ext cx="11317357" cy="6872461"/>
-          </a:xfrm>
-          <a:prstGeom prst="rect">
-            <a:avLst/>
-          </a:prstGeom>
-        </p:spPr>
-      </p:pic>
       <p:sp>
         <p:nvSpPr>
           <p:cNvPr id="2" name="Title 1"/>
@@ -13584,32 +13590,21 @@
             <p:ph type="title"/>
           </p:nvPr>
         </p:nvSpPr>
-        <p:spPr>
-          <a:xfrm>
-            <a:off x="7288696" y="1447801"/>
-            <a:ext cx="2627671" cy="855132"/>
-          </a:xfrm>
-        </p:spPr>
+        <p:spPr/>
         <p:txBody>
-          <a:bodyPr>
-            <a:normAutofit fontScale="90000"/>
-          </a:bodyPr>
+          <a:bodyPr/>
           <a:lstStyle/>
           <a:p>
             <a:r>
-              <a:rPr lang="en-US" sz="3300" dirty="0">
-                <a:solidFill>
-                  <a:srgbClr val="00B050"/>
-                </a:solidFill>
-              </a:rPr>
-              <a:t>So I know what it is. Now how do I use it?</a:t>
+              <a:rPr lang="en-US" dirty="0"/>
+              <a:t>What can @media Queries be used for?</a:t>
             </a:r>
           </a:p>
         </p:txBody>
       </p:sp>
       <p:sp>
         <p:nvSpPr>
-          <p:cNvPr id="8" name="Content Placeholder 7"/>
+          <p:cNvPr id="3" name="Content Placeholder 2"/>
           <p:cNvSpPr>
             <a:spLocks noGrp="1"/>
           </p:cNvSpPr>
@@ -13617,168 +13612,73 @@
             <p:ph idx="1"/>
           </p:nvPr>
         </p:nvSpPr>
-        <p:spPr>
-          <a:xfrm>
-            <a:off x="1727200" y="2446868"/>
-            <a:ext cx="8254999" cy="2971800"/>
-          </a:xfrm>
-        </p:spPr>
+        <p:spPr/>
         <p:txBody>
-          <a:bodyPr anchor="t">
-            <a:normAutofit/>
-          </a:bodyPr>
+          <a:bodyPr/>
           <a:lstStyle/>
           <a:p>
-            <a:endParaRPr lang="en-US" sz="1600" dirty="0">
-              <a:solidFill>
-                <a:schemeClr val="bg1"/>
-              </a:solidFill>
-            </a:endParaRPr>
+            <a:endParaRPr lang="en-US" dirty="0"/>
+          </a:p>
+          <a:p>
+            <a:r>
+              <a:rPr lang="en-US" dirty="0"/>
+              <a:t>In addition, @media Queries are used for</a:t>
+            </a:r>
+          </a:p>
+          <a:p>
+            <a:pPr lvl="1"/>
+            <a:r>
+              <a:rPr lang="en-US" dirty="0"/>
+              <a:t>Printers</a:t>
+            </a:r>
+          </a:p>
+          <a:p>
+            <a:pPr lvl="1"/>
+            <a:r>
+              <a:rPr lang="en-US" dirty="0"/>
+              <a:t>Speech readers</a:t>
+            </a:r>
+          </a:p>
+          <a:p>
+            <a:pPr lvl="1"/>
+            <a:r>
+              <a:rPr lang="en-US" dirty="0"/>
+              <a:t>Television Internet screens (starting to be phased out)</a:t>
+            </a:r>
+          </a:p>
+          <a:p>
+            <a:pPr lvl="1"/>
+            <a:r>
+              <a:rPr lang="en-US" dirty="0" err="1"/>
+              <a:t>Braile</a:t>
+            </a:r>
+            <a:r>
+              <a:rPr lang="en-US" dirty="0"/>
+              <a:t> Devices (Ditto)</a:t>
+            </a:r>
+          </a:p>
+          <a:p>
+            <a:pPr lvl="1"/>
+            <a:r>
+              <a:rPr lang="en-US" dirty="0"/>
+              <a:t>All screens for responsive web pages</a:t>
+            </a:r>
+          </a:p>
+          <a:p>
+            <a:endParaRPr lang="en-US" dirty="0"/>
           </a:p>
         </p:txBody>
       </p:sp>
     </p:spTree>
     <p:extLst>
       <p:ext uri="{BB962C8B-B14F-4D97-AF65-F5344CB8AC3E}">
-        <p14:creationId xmlns:p14="http://schemas.microsoft.com/office/powerpoint/2010/main" val="3133958515"/>
+        <p14:creationId xmlns:p14="http://schemas.microsoft.com/office/powerpoint/2010/main" val="2362953692"/>
       </p:ext>
     </p:extLst>
   </p:cSld>
   <p:clrMapOvr>
     <a:masterClrMapping/>
   </p:clrMapOvr>
-  <p:timing>
-    <p:tnLst>
-      <p:par>
-        <p:cTn id="1" dur="indefinite" restart="never" nodeType="tmRoot">
-          <p:childTnLst>
-            <p:seq concurrent="1" nextAc="seek">
-              <p:cTn id="2" dur="indefinite" nodeType="mainSeq">
-                <p:childTnLst>
-                  <p:par>
-                    <p:cTn id="3" fill="hold">
-                      <p:stCondLst>
-                        <p:cond delay="indefinite"/>
-                      </p:stCondLst>
-                      <p:childTnLst>
-                        <p:par>
-                          <p:cTn id="4" fill="hold">
-                            <p:stCondLst>
-                              <p:cond delay="0"/>
-                            </p:stCondLst>
-                            <p:childTnLst>
-                              <p:par>
-                                <p:cTn id="5" presetID="42" presetClass="exit" presetSubtype="0" fill="hold" grpId="0" nodeType="clickEffect">
-                                  <p:stCondLst>
-                                    <p:cond delay="0"/>
-                                  </p:stCondLst>
-                                  <p:childTnLst>
-                                    <p:animEffect transition="out" filter="fade">
-                                      <p:cBhvr>
-                                        <p:cTn id="6" dur="1000"/>
-                                        <p:tgtEl>
-                                          <p:spTgt spid="2"/>
-                                        </p:tgtEl>
-                                      </p:cBhvr>
-                                    </p:animEffect>
-                                    <p:anim calcmode="lin" valueType="num">
-                                      <p:cBhvr>
-                                        <p:cTn id="7" dur="1000"/>
-                                        <p:tgtEl>
-                                          <p:spTgt spid="2"/>
-                                        </p:tgtEl>
-                                        <p:attrNameLst>
-                                          <p:attrName>ppt_x</p:attrName>
-                                        </p:attrNameLst>
-                                      </p:cBhvr>
-                                      <p:tavLst>
-                                        <p:tav tm="0">
-                                          <p:val>
-                                            <p:strVal val="ppt_x"/>
-                                          </p:val>
-                                        </p:tav>
-                                        <p:tav tm="100000">
-                                          <p:val>
-                                            <p:strVal val="ppt_x"/>
-                                          </p:val>
-                                        </p:tav>
-                                      </p:tavLst>
-                                    </p:anim>
-                                    <p:anim calcmode="lin" valueType="num">
-                                      <p:cBhvr>
-                                        <p:cTn id="8" dur="1000"/>
-                                        <p:tgtEl>
-                                          <p:spTgt spid="2"/>
-                                        </p:tgtEl>
-                                        <p:attrNameLst>
-                                          <p:attrName>ppt_y</p:attrName>
-                                        </p:attrNameLst>
-                                      </p:cBhvr>
-                                      <p:tavLst>
-                                        <p:tav tm="0">
-                                          <p:val>
-                                            <p:strVal val="ppt_y"/>
-                                          </p:val>
-                                        </p:tav>
-                                        <p:tav tm="100000">
-                                          <p:val>
-                                            <p:strVal val="ppt_y+.1"/>
-                                          </p:val>
-                                        </p:tav>
-                                      </p:tavLst>
-                                    </p:anim>
-                                    <p:set>
-                                      <p:cBhvr>
-                                        <p:cTn id="9" dur="1" fill="hold">
-                                          <p:stCondLst>
-                                            <p:cond delay="999"/>
-                                          </p:stCondLst>
-                                        </p:cTn>
-                                        <p:tgtEl>
-                                          <p:spTgt spid="2"/>
-                                        </p:tgtEl>
-                                        <p:attrNameLst>
-                                          <p:attrName>style.visibility</p:attrName>
-                                        </p:attrNameLst>
-                                      </p:cBhvr>
-                                      <p:to>
-                                        <p:strVal val="hidden"/>
-                                      </p:to>
-                                    </p:set>
-                                  </p:childTnLst>
-                                </p:cTn>
-                              </p:par>
-                            </p:childTnLst>
-                          </p:cTn>
-                        </p:par>
-                      </p:childTnLst>
-                    </p:cTn>
-                  </p:par>
-                </p:childTnLst>
-              </p:cTn>
-              <p:prevCondLst>
-                <p:cond evt="onPrev" delay="0">
-                  <p:tgtEl>
-                    <p:sldTgt/>
-                  </p:tgtEl>
-                </p:cond>
-              </p:prevCondLst>
-              <p:nextCondLst>
-                <p:cond evt="onNext" delay="0">
-                  <p:tgtEl>
-                    <p:sldTgt/>
-                  </p:tgtEl>
-                </p:cond>
-              </p:nextCondLst>
-            </p:seq>
-          </p:childTnLst>
-        </p:cTn>
-      </p:par>
-    </p:tnLst>
-    <p:bldLst>
-      <p:bldP spid="2" grpId="0"/>
-    </p:bldLst>
-  </p:timing>
 </p:sld>
 </file>
 
@@ -13838,11 +13738,14 @@
           <a:p>
             <a:r>
               <a:rPr lang="en-US" dirty="0"/>
-              <a:t>Some</a:t>
+              <a:t>Some of the biggest uses are to create responsive web pages based upon the size of screens (to change the look of your site)</a:t>
             </a:r>
           </a:p>
           <a:p>
-            <a:endParaRPr lang="en-US" dirty="0"/>
+            <a:r>
+              <a:rPr lang="en-US" dirty="0"/>
+              <a:t>This is something that is used by many different sites (such as Disney or any major web site)</a:t>
+            </a:r>
           </a:p>
           <a:p>
             <a:endParaRPr lang="en-US" dirty="0"/>
@@ -13865,6 +13768,478 @@
   <p:clrMapOvr>
     <a:masterClrMapping/>
   </p:clrMapOvr>
+</p:sld>
+</file>
+
+<file path=ppt/slides/slide5.xml><?xml version="1.0" encoding="utf-8"?>
+<p:sld xmlns:a="http://schemas.openxmlformats.org/drawingml/2006/main" xmlns:r="http://schemas.openxmlformats.org/officeDocument/2006/relationships" xmlns:p="http://schemas.openxmlformats.org/presentationml/2006/main">
+  <p:cSld>
+    <p:spTree>
+      <p:nvGrpSpPr>
+        <p:cNvPr id="1" name=""/>
+        <p:cNvGrpSpPr/>
+        <p:nvPr/>
+      </p:nvGrpSpPr>
+      <p:grpSpPr>
+        <a:xfrm>
+          <a:off x="0" y="0"/>
+          <a:ext cx="0" cy="0"/>
+          <a:chOff x="0" y="0"/>
+          <a:chExt cx="0" cy="0"/>
+        </a:xfrm>
+      </p:grpSpPr>
+      <p:sp>
+        <p:nvSpPr>
+          <p:cNvPr id="2" name="Title 1"/>
+          <p:cNvSpPr>
+            <a:spLocks noGrp="1"/>
+          </p:cNvSpPr>
+          <p:nvPr>
+            <p:ph type="title"/>
+          </p:nvPr>
+        </p:nvSpPr>
+        <p:spPr>
+          <a:xfrm>
+            <a:off x="2266123" y="2865784"/>
+            <a:ext cx="8485132" cy="855132"/>
+          </a:xfrm>
+        </p:spPr>
+        <p:txBody>
+          <a:bodyPr>
+            <a:noAutofit/>
+          </a:bodyPr>
+          <a:lstStyle/>
+          <a:p>
+            <a:r>
+              <a:rPr lang="en-US" sz="4800" dirty="0">
+                <a:solidFill>
+                  <a:schemeClr val="tx1"/>
+                </a:solidFill>
+              </a:rPr>
+              <a:t>So I know what it is. Now how do I use it?</a:t>
+            </a:r>
+          </a:p>
+        </p:txBody>
+      </p:sp>
+      <p:pic>
+        <p:nvPicPr>
+          <p:cNvPr id="6" name="Content Placeholder 3"/>
+          <p:cNvPicPr>
+            <a:picLocks noChangeAspect="1"/>
+          </p:cNvPicPr>
+          <p:nvPr/>
+        </p:nvPicPr>
+        <p:blipFill rotWithShape="1">
+          <a:blip r:embed="rId2">
+            <a:alphaModFix/>
+          </a:blip>
+          <a:srcRect l="20181" t="6091" b="7739"/>
+          <a:stretch/>
+        </p:blipFill>
+        <p:spPr>
+          <a:xfrm>
+            <a:off x="410816" y="0"/>
+            <a:ext cx="11317357" cy="6872461"/>
+          </a:xfrm>
+          <a:prstGeom prst="rect">
+            <a:avLst/>
+          </a:prstGeom>
+        </p:spPr>
+      </p:pic>
+    </p:spTree>
+    <p:extLst>
+      <p:ext uri="{BB962C8B-B14F-4D97-AF65-F5344CB8AC3E}">
+        <p14:creationId xmlns:p14="http://schemas.microsoft.com/office/powerpoint/2010/main" val="3133958515"/>
+      </p:ext>
+    </p:extLst>
+  </p:cSld>
+  <p:clrMapOvr>
+    <a:masterClrMapping/>
+  </p:clrMapOvr>
+  <p:timing>
+    <p:tnLst>
+      <p:par>
+        <p:cTn id="1" dur="indefinite" restart="never" nodeType="tmRoot">
+          <p:childTnLst>
+            <p:seq concurrent="1" nextAc="seek">
+              <p:cTn id="2" dur="indefinite" nodeType="mainSeq">
+                <p:childTnLst>
+                  <p:par>
+                    <p:cTn id="3" fill="hold">
+                      <p:stCondLst>
+                        <p:cond delay="indefinite"/>
+                      </p:stCondLst>
+                      <p:childTnLst>
+                        <p:par>
+                          <p:cTn id="4" fill="hold">
+                            <p:stCondLst>
+                              <p:cond delay="0"/>
+                            </p:stCondLst>
+                            <p:childTnLst>
+                              <p:par>
+                                <p:cTn id="5" presetID="2" presetClass="entr" presetSubtype="4" fill="hold" nodeType="clickEffect">
+                                  <p:stCondLst>
+                                    <p:cond delay="0"/>
+                                  </p:stCondLst>
+                                  <p:childTnLst>
+                                    <p:set>
+                                      <p:cBhvr>
+                                        <p:cTn id="6" dur="1" fill="hold">
+                                          <p:stCondLst>
+                                            <p:cond delay="0"/>
+                                          </p:stCondLst>
+                                        </p:cTn>
+                                        <p:tgtEl>
+                                          <p:spTgt spid="6"/>
+                                        </p:tgtEl>
+                                        <p:attrNameLst>
+                                          <p:attrName>style.visibility</p:attrName>
+                                        </p:attrNameLst>
+                                      </p:cBhvr>
+                                      <p:to>
+                                        <p:strVal val="visible"/>
+                                      </p:to>
+                                    </p:set>
+                                    <p:anim calcmode="lin" valueType="num">
+                                      <p:cBhvr additive="base">
+                                        <p:cTn id="7" dur="500" fill="hold"/>
+                                        <p:tgtEl>
+                                          <p:spTgt spid="6"/>
+                                        </p:tgtEl>
+                                        <p:attrNameLst>
+                                          <p:attrName>ppt_x</p:attrName>
+                                        </p:attrNameLst>
+                                      </p:cBhvr>
+                                      <p:tavLst>
+                                        <p:tav tm="0">
+                                          <p:val>
+                                            <p:strVal val="#ppt_x"/>
+                                          </p:val>
+                                        </p:tav>
+                                        <p:tav tm="100000">
+                                          <p:val>
+                                            <p:strVal val="#ppt_x"/>
+                                          </p:val>
+                                        </p:tav>
+                                      </p:tavLst>
+                                    </p:anim>
+                                    <p:anim calcmode="lin" valueType="num">
+                                      <p:cBhvr additive="base">
+                                        <p:cTn id="8" dur="500" fill="hold"/>
+                                        <p:tgtEl>
+                                          <p:spTgt spid="6"/>
+                                        </p:tgtEl>
+                                        <p:attrNameLst>
+                                          <p:attrName>ppt_y</p:attrName>
+                                        </p:attrNameLst>
+                                      </p:cBhvr>
+                                      <p:tavLst>
+                                        <p:tav tm="0">
+                                          <p:val>
+                                            <p:strVal val="1+#ppt_h/2"/>
+                                          </p:val>
+                                        </p:tav>
+                                        <p:tav tm="100000">
+                                          <p:val>
+                                            <p:strVal val="#ppt_y"/>
+                                          </p:val>
+                                        </p:tav>
+                                      </p:tavLst>
+                                    </p:anim>
+                                  </p:childTnLst>
+                                </p:cTn>
+                              </p:par>
+                            </p:childTnLst>
+                          </p:cTn>
+                        </p:par>
+                      </p:childTnLst>
+                    </p:cTn>
+                  </p:par>
+                </p:childTnLst>
+              </p:cTn>
+              <p:prevCondLst>
+                <p:cond evt="onPrev" delay="0">
+                  <p:tgtEl>
+                    <p:sldTgt/>
+                  </p:tgtEl>
+                </p:cond>
+              </p:prevCondLst>
+              <p:nextCondLst>
+                <p:cond evt="onNext" delay="0">
+                  <p:tgtEl>
+                    <p:sldTgt/>
+                  </p:tgtEl>
+                </p:cond>
+              </p:nextCondLst>
+            </p:seq>
+          </p:childTnLst>
+        </p:cTn>
+      </p:par>
+    </p:tnLst>
+  </p:timing>
+</p:sld>
+</file>
+
+<file path=ppt/slides/slide6.xml><?xml version="1.0" encoding="utf-8"?>
+<p:sld xmlns:a="http://schemas.openxmlformats.org/drawingml/2006/main" xmlns:r="http://schemas.openxmlformats.org/officeDocument/2006/relationships" xmlns:p="http://schemas.openxmlformats.org/presentationml/2006/main">
+  <p:cSld>
+    <p:spTree>
+      <p:nvGrpSpPr>
+        <p:cNvPr id="1" name=""/>
+        <p:cNvGrpSpPr/>
+        <p:nvPr/>
+      </p:nvGrpSpPr>
+      <p:grpSpPr>
+        <a:xfrm>
+          <a:off x="0" y="0"/>
+          <a:ext cx="0" cy="0"/>
+          <a:chOff x="0" y="0"/>
+          <a:chExt cx="0" cy="0"/>
+        </a:xfrm>
+      </p:grpSpPr>
+      <p:sp>
+        <p:nvSpPr>
+          <p:cNvPr id="2" name="Title 1"/>
+          <p:cNvSpPr>
+            <a:spLocks noGrp="1"/>
+          </p:cNvSpPr>
+          <p:nvPr>
+            <p:ph type="title"/>
+          </p:nvPr>
+        </p:nvSpPr>
+        <p:spPr>
+          <a:xfrm>
+            <a:off x="0" y="3253042"/>
+            <a:ext cx="12192000" cy="706964"/>
+          </a:xfrm>
+        </p:spPr>
+        <p:txBody>
+          <a:bodyPr/>
+          <a:lstStyle/>
+          <a:p>
+            <a:pPr algn="ctr"/>
+            <a:r>
+              <a:rPr lang="en-US" sz="7000" dirty="0">
+                <a:solidFill>
+                  <a:schemeClr val="tx1"/>
+                </a:solidFill>
+              </a:rPr>
+              <a:t>Questions?</a:t>
+            </a:r>
+          </a:p>
+        </p:txBody>
+      </p:sp>
+    </p:spTree>
+    <p:extLst>
+      <p:ext uri="{BB962C8B-B14F-4D97-AF65-F5344CB8AC3E}">
+        <p14:creationId xmlns:p14="http://schemas.microsoft.com/office/powerpoint/2010/main" val="2125619807"/>
+      </p:ext>
+    </p:extLst>
+  </p:cSld>
+  <p:clrMapOvr>
+    <a:masterClrMapping/>
+  </p:clrMapOvr>
+</p:sld>
+</file>
+
+<file path=ppt/slides/slide7.xml><?xml version="1.0" encoding="utf-8"?>
+<p:sld xmlns:a="http://schemas.openxmlformats.org/drawingml/2006/main" xmlns:r="http://schemas.openxmlformats.org/officeDocument/2006/relationships" xmlns:p="http://schemas.openxmlformats.org/presentationml/2006/main">
+  <p:cSld>
+    <p:spTree>
+      <p:nvGrpSpPr>
+        <p:cNvPr id="1" name=""/>
+        <p:cNvGrpSpPr/>
+        <p:nvPr/>
+      </p:nvGrpSpPr>
+      <p:grpSpPr>
+        <a:xfrm>
+          <a:off x="0" y="0"/>
+          <a:ext cx="0" cy="0"/>
+          <a:chOff x="0" y="0"/>
+          <a:chExt cx="0" cy="0"/>
+        </a:xfrm>
+      </p:grpSpPr>
+      <p:pic>
+        <p:nvPicPr>
+          <p:cNvPr id="2" name="Porky Pig Cartoon Ending 'That's All Folks!'">
+            <a:hlinkClick r:id="" action="ppaction://media"/>
+          </p:cNvPr>
+          <p:cNvPicPr>
+            <a:picLocks noChangeAspect="1"/>
+          </p:cNvPicPr>
+          <p:nvPr>
+            <a:videoFile r:link="rId2"/>
+            <p:extLst>
+              <p:ext uri="{DAA4B4D4-6D71-4841-9C94-3DE7FCFB9230}">
+                <p14:media xmlns:p14="http://schemas.microsoft.com/office/powerpoint/2010/main" r:embed="rId1"/>
+              </p:ext>
+            </p:extLst>
+          </p:nvPr>
+        </p:nvPicPr>
+        <p:blipFill>
+          <a:blip r:embed="rId4"/>
+          <a:stretch>
+            <a:fillRect/>
+          </a:stretch>
+        </p:blipFill>
+        <p:spPr>
+          <a:xfrm>
+            <a:off x="1152939" y="0"/>
+            <a:ext cx="9157252" cy="6867939"/>
+          </a:xfrm>
+          <a:prstGeom prst="rect">
+            <a:avLst/>
+          </a:prstGeom>
+        </p:spPr>
+      </p:pic>
+    </p:spTree>
+    <p:extLst>
+      <p:ext uri="{BB962C8B-B14F-4D97-AF65-F5344CB8AC3E}">
+        <p14:creationId xmlns:p14="http://schemas.microsoft.com/office/powerpoint/2010/main" val="3053088750"/>
+      </p:ext>
+    </p:extLst>
+  </p:cSld>
+  <p:clrMapOvr>
+    <a:masterClrMapping/>
+  </p:clrMapOvr>
+  <p:timing>
+    <p:tnLst>
+      <p:par>
+        <p:cTn id="1" dur="indefinite" restart="never" nodeType="tmRoot">
+          <p:childTnLst>
+            <p:seq concurrent="1" nextAc="seek">
+              <p:cTn id="2" dur="indefinite" nodeType="mainSeq">
+                <p:childTnLst>
+                  <p:par>
+                    <p:cTn id="3" fill="hold">
+                      <p:stCondLst>
+                        <p:cond delay="indefinite"/>
+                        <p:cond evt="onBegin" delay="0">
+                          <p:tn val="2"/>
+                        </p:cond>
+                      </p:stCondLst>
+                      <p:childTnLst>
+                        <p:par>
+                          <p:cTn id="4" fill="hold">
+                            <p:stCondLst>
+                              <p:cond delay="0"/>
+                            </p:stCondLst>
+                            <p:childTnLst>
+                              <p:par>
+                                <p:cTn id="5" presetID="1" presetClass="mediacall" presetSubtype="0" fill="hold" nodeType="afterEffect">
+                                  <p:stCondLst>
+                                    <p:cond delay="0"/>
+                                  </p:stCondLst>
+                                  <p:childTnLst>
+                                    <p:cmd type="call" cmd="playFrom(0.0)">
+                                      <p:cBhvr>
+                                        <p:cTn id="6" dur="7916" fill="hold"/>
+                                        <p:tgtEl>
+                                          <p:spTgt spid="2"/>
+                                        </p:tgtEl>
+                                      </p:cBhvr>
+                                    </p:cmd>
+                                  </p:childTnLst>
+                                </p:cTn>
+                              </p:par>
+                            </p:childTnLst>
+                          </p:cTn>
+                        </p:par>
+                      </p:childTnLst>
+                    </p:cTn>
+                  </p:par>
+                </p:childTnLst>
+              </p:cTn>
+              <p:prevCondLst>
+                <p:cond evt="onPrev" delay="0">
+                  <p:tgtEl>
+                    <p:sldTgt/>
+                  </p:tgtEl>
+                </p:cond>
+              </p:prevCondLst>
+              <p:nextCondLst>
+                <p:cond evt="onNext" delay="0">
+                  <p:tgtEl>
+                    <p:sldTgt/>
+                  </p:tgtEl>
+                </p:cond>
+              </p:nextCondLst>
+            </p:seq>
+            <p:video fullScrn="1">
+              <p:cMediaNode vol="80000">
+                <p:cTn id="7" fill="hold" display="0">
+                  <p:stCondLst>
+                    <p:cond delay="indefinite"/>
+                  </p:stCondLst>
+                </p:cTn>
+                <p:tgtEl>
+                  <p:spTgt spid="2"/>
+                </p:tgtEl>
+              </p:cMediaNode>
+            </p:video>
+            <p:seq concurrent="1" nextAc="seek">
+              <p:cTn id="8" restart="whenNotActive" fill="hold" evtFilter="cancelBubble" nodeType="interactiveSeq">
+                <p:stCondLst>
+                  <p:cond evt="onClick" delay="0">
+                    <p:tgtEl>
+                      <p:spTgt spid="2"/>
+                    </p:tgtEl>
+                  </p:cond>
+                </p:stCondLst>
+                <p:endSync evt="end" delay="0">
+                  <p:rtn val="all"/>
+                </p:endSync>
+                <p:childTnLst>
+                  <p:par>
+                    <p:cTn id="9" fill="hold">
+                      <p:stCondLst>
+                        <p:cond delay="0"/>
+                      </p:stCondLst>
+                      <p:childTnLst>
+                        <p:par>
+                          <p:cTn id="10" fill="hold">
+                            <p:stCondLst>
+                              <p:cond delay="0"/>
+                            </p:stCondLst>
+                            <p:childTnLst>
+                              <p:par>
+                                <p:cTn id="11" presetID="2" presetClass="mediacall" presetSubtype="0" fill="hold" nodeType="clickEffect">
+                                  <p:stCondLst>
+                                    <p:cond delay="0"/>
+                                  </p:stCondLst>
+                                  <p:childTnLst>
+                                    <p:cmd type="call" cmd="togglePause">
+                                      <p:cBhvr>
+                                        <p:cTn id="12" dur="1" fill="hold"/>
+                                        <p:tgtEl>
+                                          <p:spTgt spid="2"/>
+                                        </p:tgtEl>
+                                      </p:cBhvr>
+                                    </p:cmd>
+                                  </p:childTnLst>
+                                </p:cTn>
+                              </p:par>
+                            </p:childTnLst>
+                          </p:cTn>
+                        </p:par>
+                      </p:childTnLst>
+                    </p:cTn>
+                  </p:par>
+                </p:childTnLst>
+              </p:cTn>
+              <p:nextCondLst>
+                <p:cond evt="onClick" delay="0">
+                  <p:tgtEl>
+                    <p:spTgt spid="2"/>
+                  </p:tgtEl>
+                </p:cond>
+              </p:nextCondLst>
+            </p:seq>
+          </p:childTnLst>
+        </p:cTn>
+      </p:par>
+    </p:tnLst>
+  </p:timing>
 </p:sld>
 </file>
 

</xml_diff>